<commit_message>
Updates in GPT versions
</commit_message>
<xml_diff>
--- a/generated.pptx
+++ b/generated.pptx
@@ -13,13 +13,6 @@
     <p:sldId id="261" r:id="rId12"/>
     <p:sldId id="262" r:id="rId13"/>
     <p:sldId id="263" r:id="rId14"/>
-    <p:sldId id="264" r:id="rId15"/>
-    <p:sldId id="265" r:id="rId16"/>
-    <p:sldId id="266" r:id="rId17"/>
-    <p:sldId id="267" r:id="rId18"/>
-    <p:sldId id="268" r:id="rId19"/>
-    <p:sldId id="269" r:id="rId20"/>
-    <p:sldId id="270" r:id="rId21"/>
   </p:sldIdLst>
   <p:sldSz cx="9144000" cy="6858000" type="screen4x3"/>
   <p:notesSz cx="6858000" cy="9144000"/>
@@ -3118,7 +3111,7 @@
           <a:lstStyle/>
           <a:p>
             <a:r>
-              <a:t>Introduction to Python Numpy</a:t>
+              <a:t>Market Overview</a:t>
             </a:r>
           </a:p>
         </p:txBody>
@@ -3139,472 +3132,27 @@
           <a:lstStyle/>
           <a:p>
             <a:r>
-              <a:t>- Numpy is a powerful library for numerical computing in Python</a:t>
-            </a:r>
-          </a:p>
-          <a:p>
-            <a:r>
-              <a:t>- Provides support for multidimensional arrays and matrices</a:t>
-            </a:r>
-          </a:p>
-          <a:p>
-            <a:r>
-              <a:t>- Essential for scientific computing and data analysis</a:t>
-            </a:r>
-          </a:p>
-          <a:p>
-            <a:r>
-              <a:t>- Open-source and widely used in the Python community</a:t>
-            </a:r>
-          </a:p>
-        </p:txBody>
-      </p:sp>
-    </p:spTree>
-  </p:cSld>
-  <p:clrMapOvr>
-    <a:masterClrMapping/>
-  </p:clrMapOvr>
-</p:sld>
-</file>
-
-<file path=ppt/slides/slide10.xml><?xml version="1.0" encoding="utf-8"?>
-<p:sld xmlns:a="http://schemas.openxmlformats.org/drawingml/2006/main" xmlns:p="http://schemas.openxmlformats.org/presentationml/2006/main" xmlns:r="http://schemas.openxmlformats.org/officeDocument/2006/relationships">
-  <p:cSld>
-    <p:spTree>
-      <p:nvGrpSpPr>
-        <p:cNvPr id="1" name=""/>
-        <p:cNvGrpSpPr/>
-        <p:nvPr/>
-      </p:nvGrpSpPr>
-      <p:grpSpPr/>
-      <p:sp>
-        <p:nvSpPr>
-          <p:cNvPr id="2" name="Title 1"/>
-          <p:cNvSpPr>
-            <a:spLocks noGrp="1"/>
-          </p:cNvSpPr>
-          <p:nvPr>
-            <p:ph type="title"/>
-          </p:nvPr>
-        </p:nvSpPr>
-        <p:spPr/>
-        <p:txBody>
-          <a:bodyPr/>
-          <a:lstStyle/>
-          <a:p>
-            <a:r>
-              <a:t>Numpy Functions and Methods</a:t>
-            </a:r>
-          </a:p>
-        </p:txBody>
-      </p:sp>
-      <p:sp>
-        <p:nvSpPr>
-          <p:cNvPr id="3" name="Content Placeholder 2"/>
-          <p:cNvSpPr>
-            <a:spLocks noGrp="1"/>
-          </p:cNvSpPr>
-          <p:nvPr>
-            <p:ph idx="1"/>
-          </p:nvPr>
-        </p:nvSpPr>
-        <p:spPr/>
-        <p:txBody>
-          <a:bodyPr/>
-          <a:lstStyle/>
-          <a:p>
-            <a:r>
-              <a:t>- Numpy provides a wide range of functions and methods for array manipulation</a:t>
-            </a:r>
-          </a:p>
-          <a:p>
-            <a:r>
-              <a:t>- Array creation functions: np.array(), np.zeros(), np.ones(), np.arange()</a:t>
-            </a:r>
-          </a:p>
-          <a:p>
-            <a:r>
-              <a:t>- Math functions: np.sin(), np.cos(), np.sqrt(), np.exp()</a:t>
-            </a:r>
-          </a:p>
-          <a:p>
-            <a:r>
-              <a:t>- Array manipulation: np.reshape(), np.concatenate(), np.split()</a:t>
-            </a:r>
-          </a:p>
-          <a:p>
-            <a:r>
-              <a:t>- Statistical functions: np.mean(), np.std(), np.var()</a:t>
-            </a:r>
-          </a:p>
-        </p:txBody>
-      </p:sp>
-    </p:spTree>
-  </p:cSld>
-  <p:clrMapOvr>
-    <a:masterClrMapping/>
-  </p:clrMapOvr>
-</p:sld>
-</file>
-
-<file path=ppt/slides/slide11.xml><?xml version="1.0" encoding="utf-8"?>
-<p:sld xmlns:a="http://schemas.openxmlformats.org/drawingml/2006/main" xmlns:p="http://schemas.openxmlformats.org/presentationml/2006/main" xmlns:r="http://schemas.openxmlformats.org/officeDocument/2006/relationships">
-  <p:cSld>
-    <p:spTree>
-      <p:nvGrpSpPr>
-        <p:cNvPr id="1" name=""/>
-        <p:cNvGrpSpPr/>
-        <p:nvPr/>
-      </p:nvGrpSpPr>
-      <p:grpSpPr/>
-      <p:sp>
-        <p:nvSpPr>
-          <p:cNvPr id="2" name="Title 1"/>
-          <p:cNvSpPr>
-            <a:spLocks noGrp="1"/>
-          </p:cNvSpPr>
-          <p:nvPr>
-            <p:ph type="title"/>
-          </p:nvPr>
-        </p:nvSpPr>
-        <p:spPr/>
-        <p:txBody>
-          <a:bodyPr/>
-          <a:lstStyle/>
-          <a:p>
-            <a:r>
-              <a:t>Performance Optimization with Numpy</a:t>
-            </a:r>
-          </a:p>
-        </p:txBody>
-      </p:sp>
-      <p:sp>
-        <p:nvSpPr>
-          <p:cNvPr id="3" name="Content Placeholder 2"/>
-          <p:cNvSpPr>
-            <a:spLocks noGrp="1"/>
-          </p:cNvSpPr>
-          <p:nvPr>
-            <p:ph idx="1"/>
-          </p:nvPr>
-        </p:nvSpPr>
-        <p:spPr/>
-        <p:txBody>
-          <a:bodyPr/>
-          <a:lstStyle/>
-          <a:p>
-            <a:r>
-              <a:t>- Numpy is optimized for performance using vectorized operations</a:t>
-            </a:r>
-          </a:p>
-          <a:p>
-            <a:r>
-              <a:t>- Avoids traditional Python loops for element-wise operations</a:t>
-            </a:r>
-          </a:p>
-          <a:p>
-            <a:r>
-              <a:t>- Improves efficiency by leveraging C under the hood</a:t>
-            </a:r>
-          </a:p>
-          <a:p>
-            <a:r>
-              <a:t>- Suitable for handling large datasets and complex computations</a:t>
-            </a:r>
-          </a:p>
-        </p:txBody>
-      </p:sp>
-    </p:spTree>
-  </p:cSld>
-  <p:clrMapOvr>
-    <a:masterClrMapping/>
-  </p:clrMapOvr>
-</p:sld>
-</file>
-
-<file path=ppt/slides/slide12.xml><?xml version="1.0" encoding="utf-8"?>
-<p:sld xmlns:a="http://schemas.openxmlformats.org/drawingml/2006/main" xmlns:p="http://schemas.openxmlformats.org/presentationml/2006/main" xmlns:r="http://schemas.openxmlformats.org/officeDocument/2006/relationships">
-  <p:cSld>
-    <p:spTree>
-      <p:nvGrpSpPr>
-        <p:cNvPr id="1" name=""/>
-        <p:cNvGrpSpPr/>
-        <p:nvPr/>
-      </p:nvGrpSpPr>
-      <p:grpSpPr/>
-      <p:sp>
-        <p:nvSpPr>
-          <p:cNvPr id="2" name="Title 1"/>
-          <p:cNvSpPr>
-            <a:spLocks noGrp="1"/>
-          </p:cNvSpPr>
-          <p:nvPr>
-            <p:ph type="title"/>
-          </p:nvPr>
-        </p:nvSpPr>
-        <p:spPr/>
-        <p:txBody>
-          <a:bodyPr/>
-          <a:lstStyle/>
-          <a:p>
-            <a:r>
-              <a:t>Handling Missing Data</a:t>
-            </a:r>
-          </a:p>
-        </p:txBody>
-      </p:sp>
-      <p:sp>
-        <p:nvSpPr>
-          <p:cNvPr id="3" name="Content Placeholder 2"/>
-          <p:cNvSpPr>
-            <a:spLocks noGrp="1"/>
-          </p:cNvSpPr>
-          <p:nvPr>
-            <p:ph idx="1"/>
-          </p:nvPr>
-        </p:nvSpPr>
-        <p:spPr/>
-        <p:txBody>
-          <a:bodyPr/>
-          <a:lstStyle/>
-          <a:p>
-            <a:r>
-              <a:t>- Numpy allows handling missing data using numpy.nan</a:t>
-            </a:r>
-          </a:p>
-          <a:p>
-            <a:r>
-              <a:t>- np.isnan() function to check for NaN values</a:t>
-            </a:r>
-          </a:p>
-          <a:p>
-            <a:r>
-              <a:t>- Masked arrays: np.ma.masked</a:t>
-            </a:r>
-          </a:p>
-        </p:txBody>
-      </p:sp>
-    </p:spTree>
-  </p:cSld>
-  <p:clrMapOvr>
-    <a:masterClrMapping/>
-  </p:clrMapOvr>
-</p:sld>
-</file>
-
-<file path=ppt/slides/slide13.xml><?xml version="1.0" encoding="utf-8"?>
-<p:sld xmlns:a="http://schemas.openxmlformats.org/drawingml/2006/main" xmlns:p="http://schemas.openxmlformats.org/presentationml/2006/main" xmlns:r="http://schemas.openxmlformats.org/officeDocument/2006/relationships">
-  <p:cSld>
-    <p:spTree>
-      <p:nvGrpSpPr>
-        <p:cNvPr id="1" name=""/>
-        <p:cNvGrpSpPr/>
-        <p:nvPr/>
-      </p:nvGrpSpPr>
-      <p:grpSpPr/>
-      <p:sp>
-        <p:nvSpPr>
-          <p:cNvPr id="2" name="Title 1"/>
-          <p:cNvSpPr>
-            <a:spLocks noGrp="1"/>
-          </p:cNvSpPr>
-          <p:nvPr>
-            <p:ph type="title"/>
-          </p:nvPr>
-        </p:nvSpPr>
-        <p:spPr/>
-        <p:txBody>
-          <a:bodyPr/>
-          <a:lstStyle/>
-          <a:p>
-            <a:r>
-              <a:t>Numpy 'ufuncs'</a:t>
-            </a:r>
-          </a:p>
-        </p:txBody>
-      </p:sp>
-      <p:sp>
-        <p:nvSpPr>
-          <p:cNvPr id="3" name="Content Placeholder 2"/>
-          <p:cNvSpPr>
-            <a:spLocks noGrp="1"/>
-          </p:cNvSpPr>
-          <p:nvPr>
-            <p:ph idx="1"/>
-          </p:nvPr>
-        </p:nvSpPr>
-        <p:spPr/>
-        <p:txBody>
-          <a:bodyPr/>
-          <a:lstStyle/>
-          <a:p>
-            <a:r>
-              <a:t>- 'ufuncs' stand for universal functions in Numpy</a:t>
-            </a:r>
-          </a:p>
-          <a:p>
-            <a:r>
-              <a:t>- Perform element-wise operations on arrays</a:t>
-            </a:r>
-          </a:p>
-          <a:p>
-            <a:r>
-              <a:t>- Examples include np.add(), np.subtract(), np.multiply(), np.divide()</a:t>
-            </a:r>
-          </a:p>
-          <a:p>
-            <a:r>
-              <a:t>- Efficient computation due to vectorization and broadcasting</a:t>
-            </a:r>
-          </a:p>
-        </p:txBody>
-      </p:sp>
-    </p:spTree>
-  </p:cSld>
-  <p:clrMapOvr>
-    <a:masterClrMapping/>
-  </p:clrMapOvr>
-</p:sld>
-</file>
-
-<file path=ppt/slides/slide14.xml><?xml version="1.0" encoding="utf-8"?>
-<p:sld xmlns:a="http://schemas.openxmlformats.org/drawingml/2006/main" xmlns:p="http://schemas.openxmlformats.org/presentationml/2006/main" xmlns:r="http://schemas.openxmlformats.org/officeDocument/2006/relationships">
-  <p:cSld>
-    <p:spTree>
-      <p:nvGrpSpPr>
-        <p:cNvPr id="1" name=""/>
-        <p:cNvGrpSpPr/>
-        <p:nvPr/>
-      </p:nvGrpSpPr>
-      <p:grpSpPr/>
-      <p:sp>
-        <p:nvSpPr>
-          <p:cNvPr id="2" name="Title 1"/>
-          <p:cNvSpPr>
-            <a:spLocks noGrp="1"/>
-          </p:cNvSpPr>
-          <p:nvPr>
-            <p:ph type="title"/>
-          </p:nvPr>
-        </p:nvSpPr>
-        <p:spPr/>
-        <p:txBody>
-          <a:bodyPr/>
-          <a:lstStyle/>
-          <a:p>
-            <a:r>
-              <a:t>Working with Multi-dimensional Arrays</a:t>
-            </a:r>
-          </a:p>
-        </p:txBody>
-      </p:sp>
-      <p:sp>
-        <p:nvSpPr>
-          <p:cNvPr id="3" name="Content Placeholder 2"/>
-          <p:cNvSpPr>
-            <a:spLocks noGrp="1"/>
-          </p:cNvSpPr>
-          <p:nvPr>
-            <p:ph idx="1"/>
-          </p:nvPr>
-        </p:nvSpPr>
-        <p:spPr/>
-        <p:txBody>
-          <a:bodyPr/>
-          <a:lstStyle/>
-          <a:p>
-            <a:r>
-              <a:t>- Numpy supports multi-dimensional arrays with any number of dimensions</a:t>
-            </a:r>
-          </a:p>
-          <a:p>
-            <a:r>
-              <a:t>- Access elements using multiple indexes for each dimension</a:t>
-            </a:r>
-          </a:p>
-          <a:p>
-            <a:r>
-              <a:t>- Example: 3D array for representing volumetric data</a:t>
-            </a:r>
-          </a:p>
-          <a:p>
-            <a:r>
-              <a:t>- Useful for mathematical operations and image processing</a:t>
-            </a:r>
-          </a:p>
-        </p:txBody>
-      </p:sp>
-    </p:spTree>
-  </p:cSld>
-  <p:clrMapOvr>
-    <a:masterClrMapping/>
-  </p:clrMapOvr>
-</p:sld>
-</file>
-
-<file path=ppt/slides/slide15.xml><?xml version="1.0" encoding="utf-8"?>
-<p:sld xmlns:a="http://schemas.openxmlformats.org/drawingml/2006/main" xmlns:p="http://schemas.openxmlformats.org/presentationml/2006/main" xmlns:r="http://schemas.openxmlformats.org/officeDocument/2006/relationships">
-  <p:cSld>
-    <p:spTree>
-      <p:nvGrpSpPr>
-        <p:cNvPr id="1" name=""/>
-        <p:cNvGrpSpPr/>
-        <p:nvPr/>
-      </p:nvGrpSpPr>
-      <p:grpSpPr/>
-      <p:sp>
-        <p:nvSpPr>
-          <p:cNvPr id="2" name="Title 1"/>
-          <p:cNvSpPr>
-            <a:spLocks noGrp="1"/>
-          </p:cNvSpPr>
-          <p:nvPr>
-            <p:ph type="title"/>
-          </p:nvPr>
-        </p:nvSpPr>
-        <p:spPr/>
-        <p:txBody>
-          <a:bodyPr/>
-          <a:lstStyle/>
-          <a:p>
-            <a:r>
-              <a:t>Numpy Advantages and Use Cases</a:t>
-            </a:r>
-          </a:p>
-        </p:txBody>
-      </p:sp>
-      <p:sp>
-        <p:nvSpPr>
-          <p:cNvPr id="3" name="Content Placeholder 2"/>
-          <p:cNvSpPr>
-            <a:spLocks noGrp="1"/>
-          </p:cNvSpPr>
-          <p:nvPr>
-            <p:ph idx="1"/>
-          </p:nvPr>
-        </p:nvSpPr>
-        <p:spPr/>
-        <p:txBody>
-          <a:bodyPr/>
-          <a:lstStyle/>
-          <a:p>
-            <a:r>
-              <a:t>- Numpy is essential for numerical computing and data analysis in Python</a:t>
-            </a:r>
-          </a:p>
-          <a:p>
-            <a:r>
-              <a:t>- Advantages include fast computation, efficient memory usage, and optimized performance</a:t>
-            </a:r>
-          </a:p>
-          <a:p>
-            <a:r>
-              <a:t>- Widely used in scientific research, data science, machine learning, and more</a:t>
-            </a:r>
-          </a:p>
-          <a:p>
-            <a:r>
-              <a:t>- Used for handling large datasets, mathematical operations, and complex analyses</a:t>
+              <a:t>- Rapid growth in e-commerce and delivery services  </a:t>
+            </a:r>
+          </a:p>
+          <a:p>
+            <a:r>
+              <a:t>- Increasing consumer demand for faster delivery options  </a:t>
+            </a:r>
+          </a:p>
+          <a:p>
+            <a:r>
+              <a:t>- Adoption of drone technology in logistics and retail  </a:t>
+            </a:r>
+          </a:p>
+          <a:p>
+            <a:r>
+              <a:t>- Competitive landscape including other retailers and delivery companies  </a:t>
+            </a:r>
+          </a:p>
+          <a:p>
+            <a:r>
+              <a:t>- Regulatory environment impacting drone usage</a:t>
             </a:r>
           </a:p>
         </p:txBody>
@@ -3643,7 +3191,7 @@
           <a:lstStyle/>
           <a:p>
             <a:r>
-              <a:t>Installing Numpy</a:t>
+              <a:t>Target Audience</a:t>
             </a:r>
           </a:p>
         </p:txBody>
@@ -3664,12 +3212,27 @@
           <a:lstStyle/>
           <a:p>
             <a:r>
-              <a:t>- Install Numpy using pip: 'pip install numpy'</a:t>
-            </a:r>
-          </a:p>
-          <a:p>
-            <a:r>
-              <a:t>- Check installed Numpy version with 'import numpy; print(numpy.</a:t>
+              <a:t>- Primary audience: Tech-savvy millennials and Gen Z  </a:t>
+            </a:r>
+          </a:p>
+          <a:p>
+            <a:r>
+              <a:t>- Secondary audience: Busy professionals and families  </a:t>
+            </a:r>
+          </a:p>
+          <a:p>
+            <a:r>
+              <a:t>- Geographic focus: Urban and suburban areas with high order volumes  </a:t>
+            </a:r>
+          </a:p>
+          <a:p>
+            <a:r>
+              <a:t>- Behavioral insights: Preference for convenience and speed in shopping  </a:t>
+            </a:r>
+          </a:p>
+          <a:p>
+            <a:r>
+              <a:t>- Environmental concerns driving interest in sustainable delivery options</a:t>
             </a:r>
           </a:p>
         </p:txBody>
@@ -3708,7 +3271,7 @@
           <a:lstStyle/>
           <a:p>
             <a:r>
-              <a:t>Numpy Arrays</a:t>
+              <a:t>Value Proposition</a:t>
             </a:r>
           </a:p>
         </p:txBody>
@@ -3729,22 +3292,27 @@
           <a:lstStyle/>
           <a:p>
             <a:r>
-              <a:t>- Numpy arrays are the core data structure in Numpy</a:t>
-            </a:r>
-          </a:p>
-          <a:p>
-            <a:r>
-              <a:t>- Arrays can have any number of dimensions</a:t>
-            </a:r>
-          </a:p>
-          <a:p>
-            <a:r>
-              <a:t>- Homogeneous data types within an array</a:t>
-            </a:r>
-          </a:p>
-          <a:p>
-            <a:r>
-              <a:t>- Can perform efficient element-wise operations</a:t>
+              <a:t>- Speed: Deliver products within 30 minutes of order placement  </a:t>
+            </a:r>
+          </a:p>
+          <a:p>
+            <a:r>
+              <a:t>- Convenience: Doorstep delivery without human contact  </a:t>
+            </a:r>
+          </a:p>
+          <a:p>
+            <a:r>
+              <a:t>- Sustainability: Lower carbon footprint compared to traditional delivery  </a:t>
+            </a:r>
+          </a:p>
+          <a:p>
+            <a:r>
+              <a:t>- Accessibility: Reach customers in hard-to-access areas  </a:t>
+            </a:r>
+          </a:p>
+          <a:p>
+            <a:r>
+              <a:t>- Innovation: Strength and credibility of IKEA brand in offering cutting-edge solutions</a:t>
             </a:r>
           </a:p>
         </p:txBody>
@@ -3783,7 +3351,7 @@
           <a:lstStyle/>
           <a:p>
             <a:r>
-              <a:t>Indexing and Slicing</a:t>
+              <a:t>Operational Strategy</a:t>
             </a:r>
           </a:p>
         </p:txBody>
@@ -3804,22 +3372,27 @@
           <a:lstStyle/>
           <a:p>
             <a:r>
-              <a:t>- Indexing starts at 0 like regular Python lists</a:t>
-            </a:r>
-          </a:p>
-          <a:p>
-            <a:r>
-              <a:t>- Accessing elements using indexes: array[0], array[1:3]</a:t>
-            </a:r>
-          </a:p>
-          <a:p>
-            <a:r>
-              <a:t>- Slicing allows selecting subsets of arrays</a:t>
-            </a:r>
-          </a:p>
-          <a:p>
-            <a:r>
-              <a:t>- Negative indexes count from the end of the array</a:t>
+              <a:t>- Partner with local logistics providers for infrastructure  </a:t>
+            </a:r>
+          </a:p>
+          <a:p>
+            <a:r>
+              <a:t>- Develop a network of drone landing zones for efficient pickups and drop-offs  </a:t>
+            </a:r>
+          </a:p>
+          <a:p>
+            <a:r>
+              <a:t>- Implement a robust technology stack for order processing and tracking  </a:t>
+            </a:r>
+          </a:p>
+          <a:p>
+            <a:r>
+              <a:t>- Ensure compliance with aviation regulations and safety standards  </a:t>
+            </a:r>
+          </a:p>
+          <a:p>
+            <a:r>
+              <a:t>- Train staff and customers on how to use the drone delivery service</a:t>
             </a:r>
           </a:p>
         </p:txBody>
@@ -3858,7 +3431,7 @@
           <a:lstStyle/>
           <a:p>
             <a:r>
-              <a:t>Numpy Operations</a:t>
+              <a:t>Marketing Approach</a:t>
             </a:r>
           </a:p>
         </p:txBody>
@@ -3879,22 +3452,27 @@
           <a:lstStyle/>
           <a:p>
             <a:r>
-              <a:t>- Arithmetic operations: addition, subtraction, multiplication, division</a:t>
-            </a:r>
-          </a:p>
-          <a:p>
-            <a:r>
-              <a:t>- Element-wise operations: np.add(), np.subtract(), np.multiply(), np.divide()</a:t>
-            </a:r>
-          </a:p>
-          <a:p>
-            <a:r>
-              <a:t>- Aggregation functions: sum, min, max, mean, median</a:t>
-            </a:r>
-          </a:p>
-          <a:p>
-            <a:r>
-              <a:t>- Broadcasting: performing operations on arrays of different shapes</a:t>
+              <a:t>- Multi-channel marketing campaign (online and offline)  </a:t>
+            </a:r>
+          </a:p>
+          <a:p>
+            <a:r>
+              <a:t>- Collaborate with influencers and tech bloggers to drive awareness  </a:t>
+            </a:r>
+          </a:p>
+          <a:p>
+            <a:r>
+              <a:t>- Demonstrate drone delivery through live events and demonstrations  </a:t>
+            </a:r>
+          </a:p>
+          <a:p>
+            <a:r>
+              <a:t>- Use targeted digital advertising to reach key demographics  </a:t>
+            </a:r>
+          </a:p>
+          <a:p>
+            <a:r>
+              <a:t>- Leverage social media to highlight customer testimonials and success stories</a:t>
             </a:r>
           </a:p>
         </p:txBody>
@@ -3933,7 +3511,7 @@
           <a:lstStyle/>
           <a:p>
             <a:r>
-              <a:t>Random Number Generation</a:t>
+              <a:t>Key Partnerships</a:t>
             </a:r>
           </a:p>
         </p:txBody>
@@ -3954,27 +3532,27 @@
           <a:lstStyle/>
           <a:p>
             <a:r>
-              <a:t>- Numpy provides functions for random number generation</a:t>
-            </a:r>
-          </a:p>
-          <a:p>
-            <a:r>
-              <a:t>- np.random.rand() for uniform distribution</a:t>
-            </a:r>
-          </a:p>
-          <a:p>
-            <a:r>
-              <a:t>- np.random.randn() for standard normal distribution</a:t>
-            </a:r>
-          </a:p>
-          <a:p>
-            <a:r>
-              <a:t>- np.random.randint() for random integers</a:t>
-            </a:r>
-          </a:p>
-          <a:p>
-            <a:r>
-              <a:t>- Set seed for reproducibility using np.random.seed()</a:t>
+              <a:t>- Collaborate with drone manufacturers for tech innovation  </a:t>
+            </a:r>
+          </a:p>
+          <a:p>
+            <a:r>
+              <a:t>- Partner with local authorities to navigate regulations  </a:t>
+            </a:r>
+          </a:p>
+          <a:p>
+            <a:r>
+              <a:t>- Tie-up with delivery service platforms for last-mile logistics  </a:t>
+            </a:r>
+          </a:p>
+          <a:p>
+            <a:r>
+              <a:t>- Engage with sustainability organizations to enhance brand image  </a:t>
+            </a:r>
+          </a:p>
+          <a:p>
+            <a:r>
+              <a:t>- Work with data analytics firms to optimize operations</a:t>
             </a:r>
           </a:p>
         </p:txBody>
@@ -4013,7 +3591,7 @@
           <a:lstStyle/>
           <a:p>
             <a:r>
-              <a:t>Linear Algebra with Numpy</a:t>
+              <a:t>Financial Projections</a:t>
             </a:r>
           </a:p>
         </p:txBody>
@@ -4034,22 +3612,27 @@
           <a:lstStyle/>
           <a:p>
             <a:r>
-              <a:t>- Numpy provides functions for linear algebra operations</a:t>
-            </a:r>
-          </a:p>
-          <a:p>
-            <a:r>
-              <a:t>- Matrix multiplication: np.dot(), @ operator</a:t>
-            </a:r>
-          </a:p>
-          <a:p>
-            <a:r>
-              <a:t>- Eigenvalues and eigenvectors: np.linalg.eig()</a:t>
-            </a:r>
-          </a:p>
-          <a:p>
-            <a:r>
-              <a:t>- Solving linear equations: np.linalg.solve()</a:t>
+              <a:t>- Initial investment required for drone fleet and technology  </a:t>
+            </a:r>
+          </a:p>
+          <a:p>
+            <a:r>
+              <a:t>- Expected return on investment (ROI) within the first 3 years  </a:t>
+            </a:r>
+          </a:p>
+          <a:p>
+            <a:r>
+              <a:t>- Revenue growth through increased sales and customer acquisition  </a:t>
+            </a:r>
+          </a:p>
+          <a:p>
+            <a:r>
+              <a:t>- Cost savings from decreased labor and fuel expenses over time  </a:t>
+            </a:r>
+          </a:p>
+          <a:p>
+            <a:r>
+              <a:t>- Long-term financial benefits from strengthening IKEA’s market position</a:t>
             </a:r>
           </a:p>
         </p:txBody>
@@ -4088,7 +3671,7 @@
           <a:lstStyle/>
           <a:p>
             <a:r>
-              <a:t>Data Analysis with Numpy</a:t>
+              <a:t>Implementation Timeline</a:t>
             </a:r>
           </a:p>
         </p:txBody>
@@ -4109,92 +3692,27 @@
           <a:lstStyle/>
           <a:p>
             <a:r>
-              <a:t>- Numpy is widely used for data manipulation and analysis</a:t>
-            </a:r>
-          </a:p>
-          <a:p>
-            <a:r>
-              <a:t>- Statistics functions: mean, median, standard deviation, variance</a:t>
-            </a:r>
-          </a:p>
-          <a:p>
-            <a:r>
-              <a:t>- Filtering data: np.where(), np.logical</a:t>
-            </a:r>
-          </a:p>
-        </p:txBody>
-      </p:sp>
-    </p:spTree>
-  </p:cSld>
-  <p:clrMapOvr>
-    <a:masterClrMapping/>
-  </p:clrMapOvr>
-</p:sld>
-</file>
-
-<file path=ppt/slides/slide9.xml><?xml version="1.0" encoding="utf-8"?>
-<p:sld xmlns:a="http://schemas.openxmlformats.org/drawingml/2006/main" xmlns:p="http://schemas.openxmlformats.org/presentationml/2006/main" xmlns:r="http://schemas.openxmlformats.org/officeDocument/2006/relationships">
-  <p:cSld>
-    <p:spTree>
-      <p:nvGrpSpPr>
-        <p:cNvPr id="1" name=""/>
-        <p:cNvGrpSpPr/>
-        <p:nvPr/>
-      </p:nvGrpSpPr>
-      <p:grpSpPr/>
-      <p:sp>
-        <p:nvSpPr>
-          <p:cNvPr id="2" name="Title 1"/>
-          <p:cNvSpPr>
-            <a:spLocks noGrp="1"/>
-          </p:cNvSpPr>
-          <p:nvPr>
-            <p:ph type="title"/>
-          </p:nvPr>
-        </p:nvSpPr>
-        <p:spPr/>
-        <p:txBody>
-          <a:bodyPr/>
-          <a:lstStyle/>
-          <a:p>
-            <a:r>
-              <a:t>Broadcasting in Numpy</a:t>
-            </a:r>
-          </a:p>
-        </p:txBody>
-      </p:sp>
-      <p:sp>
-        <p:nvSpPr>
-          <p:cNvPr id="3" name="Content Placeholder 2"/>
-          <p:cNvSpPr>
-            <a:spLocks noGrp="1"/>
-          </p:cNvSpPr>
-          <p:nvPr>
-            <p:ph idx="1"/>
-          </p:nvPr>
-        </p:nvSpPr>
-        <p:spPr/>
-        <p:txBody>
-          <a:bodyPr/>
-          <a:lstStyle/>
-          <a:p>
-            <a:r>
-              <a:t>- Broadcasting allows performing operations on arrays of different shapes</a:t>
-            </a:r>
-          </a:p>
-          <a:p>
-            <a:r>
-              <a:t>- Arrays are broadcasted to have compatible shapes before performing operations</a:t>
-            </a:r>
-          </a:p>
-          <a:p>
-            <a:r>
-              <a:t>- Helps avoid looping over elements for element-wise operations</a:t>
-            </a:r>
-          </a:p>
-          <a:p>
-            <a:r>
-              <a:t>- Useful for arithmetic operations on arrays of different dimensions</a:t>
+              <a:t>- Phase 1: Research &amp; Development (0-6 months)  </a:t>
+            </a:r>
+          </a:p>
+          <a:p>
+            <a:r>
+              <a:t>- Phase 2: Pilot program launch in select cities (6-12 months)  </a:t>
+            </a:r>
+          </a:p>
+          <a:p>
+            <a:r>
+              <a:t>- Phase 3: Full-scale rollout across urban areas (12-24 months)  </a:t>
+            </a:r>
+          </a:p>
+          <a:p>
+            <a:r>
+              <a:t>- Phase 4: Evaluation and iterative enhancements (24+ months)  </a:t>
+            </a:r>
+          </a:p>
+          <a:p>
+            <a:r>
+              <a:t>- Continuous monitoring of market feedback and operational challenges</a:t>
             </a:r>
           </a:p>
         </p:txBody>

</xml_diff>